<commit_message>
2 [MODIFY] Correct first slide
</commit_message>
<xml_diff>
--- a/Documentation/Study of posibilities.pptx
+++ b/Documentation/Study of posibilities.pptx
@@ -319,7 +319,7 @@
             <a:pPr rtl="0"/>
             <a:fld id="{BD65BC62-3B36-43F8-8B69-D6E5E743DA31}" type="slidenum">
               <a:rPr lang="fr-FR" smtClean="0"/>
-              <a:t>‹#›</a:t>
+              <a:t>‹N°›</a:t>
             </a:fld>
             <a:endParaRPr lang="fr-FR"/>
           </a:p>
@@ -582,7 +582,7 @@
             <a:pPr rtl="0"/>
             <a:fld id="{E6AEB063-7F11-4E3B-BA52-07405B1C2D95}" type="slidenum">
               <a:rPr lang="fr-FR" noProof="0" smtClean="0"/>
-              <a:t>‹#›</a:t>
+              <a:t>‹N°›</a:t>
             </a:fld>
             <a:endParaRPr lang="fr-FR" noProof="0"/>
           </a:p>
@@ -2362,7 +2362,7 @@
           </a:effectLst>
           <a:extLst>
             <a:ext uri="{91240B29-F687-4f45-9708-019B960494DF}">
-              <a14:hiddenLine xmlns:a14="http://schemas.microsoft.com/office/drawing/2010/main" xmlns="" w="9525">
+              <a14:hiddenLine xmlns="" xmlns:a14="http://schemas.microsoft.com/office/drawing/2010/main" w="9525">
                 <a:solidFill>
                   <a:srgbClr val="000000"/>
                 </a:solidFill>
@@ -2604,7 +2604,7 @@
             <a:pPr rtl="0"/>
             <a:fld id="{A4942799-31AF-4FF8-9D79-C1A3E01FB207}" type="slidenum">
               <a:rPr lang="fr-FR" noProof="0" smtClean="0"/>
-              <a:t>‹#›</a:t>
+              <a:t>‹N°›</a:t>
             </a:fld>
             <a:endParaRPr lang="fr-FR" noProof="0"/>
           </a:p>
@@ -2960,7 +2960,7 @@
             <a:pPr rtl="0"/>
             <a:fld id="{A4942799-31AF-4FF8-9D79-C1A3E01FB207}" type="slidenum">
               <a:rPr lang="fr-FR" noProof="0" smtClean="0"/>
-              <a:t>‹#›</a:t>
+              <a:t>‹N°›</a:t>
             </a:fld>
             <a:endParaRPr lang="fr-FR" noProof="0"/>
           </a:p>
@@ -3080,7 +3080,7 @@
           </a:effectLst>
           <a:extLst>
             <a:ext uri="{91240B29-F687-4f45-9708-019B960494DF}">
-              <a14:hiddenLine xmlns:a14="http://schemas.microsoft.com/office/drawing/2010/main" xmlns="" w="9525">
+              <a14:hiddenLine xmlns="" xmlns:a14="http://schemas.microsoft.com/office/drawing/2010/main" w="9525">
                 <a:solidFill>
                   <a:srgbClr val="000000"/>
                 </a:solidFill>
@@ -3448,7 +3448,7 @@
             <a:pPr rtl="0"/>
             <a:fld id="{A4942799-31AF-4FF8-9D79-C1A3E01FB207}" type="slidenum">
               <a:rPr lang="fr-FR" noProof="0" smtClean="0"/>
-              <a:t>‹#›</a:t>
+              <a:t>‹N°›</a:t>
             </a:fld>
             <a:endParaRPr lang="fr-FR" noProof="0"/>
           </a:p>
@@ -3568,7 +3568,7 @@
           </a:effectLst>
           <a:extLst>
             <a:ext uri="{91240B29-F687-4f45-9708-019B960494DF}">
-              <a14:hiddenLine xmlns:a14="http://schemas.microsoft.com/office/drawing/2010/main" xmlns="" w="9525">
+              <a14:hiddenLine xmlns="" xmlns:a14="http://schemas.microsoft.com/office/drawing/2010/main" w="9525">
                 <a:solidFill>
                   <a:srgbClr val="000000"/>
                 </a:solidFill>
@@ -3686,7 +3686,7 @@
             <a:pPr rtl="0"/>
             <a:fld id="{A4942799-31AF-4FF8-9D79-C1A3E01FB207}" type="slidenum">
               <a:rPr lang="fr-FR" noProof="0" smtClean="0"/>
-              <a:t>‹#›</a:t>
+              <a:t>‹N°›</a:t>
             </a:fld>
             <a:endParaRPr lang="fr-FR" noProof="0"/>
           </a:p>
@@ -3787,7 +3787,7 @@
             <a:pPr rtl="0"/>
             <a:fld id="{A4942799-31AF-4FF8-9D79-C1A3E01FB207}" type="slidenum">
               <a:rPr lang="fr-FR" noProof="0" smtClean="0"/>
-              <a:t>‹#›</a:t>
+              <a:t>‹N°›</a:t>
             </a:fld>
             <a:endParaRPr lang="fr-FR" noProof="0"/>
           </a:p>
@@ -4018,7 +4018,7 @@
           </a:effectLst>
           <a:extLst>
             <a:ext uri="{91240B29-F687-4f45-9708-019B960494DF}">
-              <a14:hiddenLine xmlns:a14="http://schemas.microsoft.com/office/drawing/2010/main" xmlns="" w="9525">
+              <a14:hiddenLine xmlns="" xmlns:a14="http://schemas.microsoft.com/office/drawing/2010/main" w="9525">
                 <a:solidFill>
                   <a:srgbClr val="000000"/>
                 </a:solidFill>
@@ -4266,7 +4266,7 @@
             <a:pPr rtl="0"/>
             <a:fld id="{A4942799-31AF-4FF8-9D79-C1A3E01FB207}" type="slidenum">
               <a:rPr lang="fr-FR" noProof="0" smtClean="0"/>
-              <a:t>‹#›</a:t>
+              <a:t>‹N°›</a:t>
             </a:fld>
             <a:endParaRPr lang="fr-FR" noProof="0"/>
           </a:p>
@@ -4767,7 +4767,7 @@
             <a:pPr rtl="0"/>
             <a:fld id="{A4942799-31AF-4FF8-9D79-C1A3E01FB207}" type="slidenum">
               <a:rPr lang="fr-FR" noProof="0" smtClean="0"/>
-              <a:t>‹#›</a:t>
+              <a:t>‹N°›</a:t>
             </a:fld>
             <a:endParaRPr lang="fr-FR" noProof="0"/>
           </a:p>
@@ -5149,7 +5149,7 @@
             <a:pPr rtl="0"/>
             <a:fld id="{A4942799-31AF-4FF8-9D79-C1A3E01FB207}" type="slidenum">
               <a:rPr lang="fr-FR" noProof="0" smtClean="0"/>
-              <a:t>‹#›</a:t>
+              <a:t>‹N°›</a:t>
             </a:fld>
             <a:endParaRPr lang="fr-FR" noProof="0"/>
           </a:p>
@@ -5271,7 +5271,7 @@
           </a:effectLst>
           <a:extLst>
             <a:ext uri="{91240B29-F687-4f45-9708-019B960494DF}">
-              <a14:hiddenLine xmlns:a14="http://schemas.microsoft.com/office/drawing/2010/main" xmlns="" w="9525">
+              <a14:hiddenLine xmlns="" xmlns:a14="http://schemas.microsoft.com/office/drawing/2010/main" w="9525">
                 <a:solidFill>
                   <a:srgbClr val="000000"/>
                 </a:solidFill>
@@ -5466,7 +5466,7 @@
             <a:pPr rtl="0"/>
             <a:fld id="{A4942799-31AF-4FF8-9D79-C1A3E01FB207}" type="slidenum">
               <a:rPr lang="fr-FR" noProof="0" smtClean="0"/>
-              <a:t>‹#›</a:t>
+              <a:t>‹N°›</a:t>
             </a:fld>
             <a:endParaRPr lang="fr-FR" noProof="0"/>
           </a:p>
@@ -5586,7 +5586,7 @@
           </a:effectLst>
           <a:extLst>
             <a:ext uri="{91240B29-F687-4f45-9708-019B960494DF}">
-              <a14:hiddenLine xmlns:a14="http://schemas.microsoft.com/office/drawing/2010/main" xmlns="" w="9525">
+              <a14:hiddenLine xmlns="" xmlns:a14="http://schemas.microsoft.com/office/drawing/2010/main" w="9525">
                 <a:solidFill>
                   <a:srgbClr val="000000"/>
                 </a:solidFill>
@@ -5786,7 +5786,7 @@
             <a:pPr rtl="0"/>
             <a:fld id="{A4942799-31AF-4FF8-9D79-C1A3E01FB207}" type="slidenum">
               <a:rPr lang="fr-FR" noProof="0" smtClean="0"/>
-              <a:t>‹#›</a:t>
+              <a:t>‹N°›</a:t>
             </a:fld>
             <a:endParaRPr lang="fr-FR" noProof="0"/>
           </a:p>
@@ -6085,7 +6085,7 @@
             <a:pPr rtl="0"/>
             <a:fld id="{A4942799-31AF-4FF8-9D79-C1A3E01FB207}" type="slidenum">
               <a:rPr lang="fr-FR" noProof="0" smtClean="0"/>
-              <a:t>‹#›</a:t>
+              <a:t>‹N°›</a:t>
             </a:fld>
             <a:endParaRPr lang="fr-FR" noProof="0"/>
           </a:p>
@@ -6205,7 +6205,7 @@
           </a:effectLst>
           <a:extLst>
             <a:ext uri="{91240B29-F687-4f45-9708-019B960494DF}">
-              <a14:hiddenLine xmlns:a14="http://schemas.microsoft.com/office/drawing/2010/main" xmlns="" w="9525">
+              <a14:hiddenLine xmlns="" xmlns:a14="http://schemas.microsoft.com/office/drawing/2010/main" w="9525">
                 <a:solidFill>
                   <a:srgbClr val="000000"/>
                 </a:solidFill>
@@ -6409,7 +6409,7 @@
             <a:pPr rtl="0"/>
             <a:fld id="{A4942799-31AF-4FF8-9D79-C1A3E01FB207}" type="slidenum">
               <a:rPr lang="fr-FR" noProof="0" smtClean="0"/>
-              <a:t>‹#›</a:t>
+              <a:t>‹N°›</a:t>
             </a:fld>
             <a:endParaRPr lang="fr-FR" noProof="0"/>
           </a:p>
@@ -6609,7 +6609,7 @@
           </a:effectLst>
           <a:extLst>
             <a:ext uri="{91240B29-F687-4f45-9708-019B960494DF}">
-              <a14:hiddenLine xmlns:a14="http://schemas.microsoft.com/office/drawing/2010/main" xmlns="" w="9525">
+              <a14:hiddenLine xmlns="" xmlns:a14="http://schemas.microsoft.com/office/drawing/2010/main" w="9525">
                 <a:solidFill>
                   <a:srgbClr val="000000"/>
                 </a:solidFill>
@@ -6887,7 +6887,7 @@
             <a:pPr rtl="0"/>
             <a:fld id="{A4942799-31AF-4FF8-9D79-C1A3E01FB207}" type="slidenum">
               <a:rPr lang="fr-FR" noProof="0" smtClean="0"/>
-              <a:t>‹#›</a:t>
+              <a:t>‹N°›</a:t>
             </a:fld>
             <a:endParaRPr lang="fr-FR" noProof="0"/>
           </a:p>
@@ -7237,7 +7237,7 @@
             <a:pPr rtl="0"/>
             <a:fld id="{A4942799-31AF-4FF8-9D79-C1A3E01FB207}" type="slidenum">
               <a:rPr lang="fr-FR" noProof="0" smtClean="0"/>
-              <a:t>‹#›</a:t>
+              <a:t>‹N°›</a:t>
             </a:fld>
             <a:endParaRPr lang="fr-FR" noProof="0"/>
           </a:p>
@@ -7430,7 +7430,7 @@
           </a:effectLst>
           <a:extLst>
             <a:ext uri="{91240B29-F687-4f45-9708-019B960494DF}">
-              <a14:hiddenLine xmlns:a14="http://schemas.microsoft.com/office/drawing/2010/main" xmlns="" w="9525">
+              <a14:hiddenLine xmlns="" xmlns:a14="http://schemas.microsoft.com/office/drawing/2010/main" w="9525">
                 <a:solidFill>
                   <a:srgbClr val="000000"/>
                 </a:solidFill>
@@ -7622,7 +7622,7 @@
             <a:pPr rtl="0"/>
             <a:fld id="{A4942799-31AF-4FF8-9D79-C1A3E01FB207}" type="slidenum">
               <a:rPr lang="fr-FR" noProof="0" smtClean="0"/>
-              <a:t>‹#›</a:t>
+              <a:t>‹N°›</a:t>
             </a:fld>
             <a:endParaRPr lang="fr-FR" noProof="0"/>
           </a:p>
@@ -7765,7 +7765,7 @@
             <a:pPr rtl="0"/>
             <a:fld id="{A4942799-31AF-4FF8-9D79-C1A3E01FB207}" type="slidenum">
               <a:rPr lang="fr-FR" noProof="0" smtClean="0"/>
-              <a:t>‹#›</a:t>
+              <a:t>‹N°›</a:t>
             </a:fld>
             <a:endParaRPr lang="fr-FR" noProof="0"/>
           </a:p>
@@ -8291,7 +8291,7 @@
           </a:effectLst>
           <a:extLst>
             <a:ext uri="{91240B29-F687-4f45-9708-019B960494DF}">
-              <a14:hiddenLine xmlns:a14="http://schemas.microsoft.com/office/drawing/2010/main" xmlns="" w="9525">
+              <a14:hiddenLine xmlns="" xmlns:a14="http://schemas.microsoft.com/office/drawing/2010/main" w="9525">
                 <a:solidFill>
                   <a:srgbClr val="000000"/>
                 </a:solidFill>
@@ -8470,7 +8470,7 @@
             <a:pPr rtl="0"/>
             <a:fld id="{A4942799-31AF-4FF8-9D79-C1A3E01FB207}" type="slidenum">
               <a:rPr lang="fr-FR" noProof="0" smtClean="0"/>
-              <a:t>‹#›</a:t>
+              <a:t>‹N°›</a:t>
             </a:fld>
             <a:endParaRPr lang="fr-FR" noProof="0"/>
           </a:p>
@@ -8720,7 +8720,7 @@
             <a:pPr rtl="0"/>
             <a:fld id="{A4942799-31AF-4FF8-9D79-C1A3E01FB207}" type="slidenum">
               <a:rPr lang="fr-FR" noProof="0" smtClean="0"/>
-              <a:t>‹#›</a:t>
+              <a:t>‹N°›</a:t>
             </a:fld>
             <a:endParaRPr lang="fr-FR" noProof="0"/>
           </a:p>
@@ -9170,18 +9170,9 @@
           <a:p>
             <a:pPr rtl="0"/>
             <a:r>
-              <a:rPr lang="fr-FR" b="0" dirty="0" err="1"/>
-              <a:t>Study</a:t>
-            </a:r>
-            <a:r>
-              <a:rPr lang="fr-FR" b="0" dirty="0"/>
-              <a:t> of </a:t>
-            </a:r>
-            <a:r>
-              <a:rPr lang="fr-FR" b="0" dirty="0" err="1"/>
-              <a:t>posibilities</a:t>
-            </a:r>
-            <a:endParaRPr lang="fr-FR" b="0" dirty="0"/>
+              <a:rPr lang="en-GB" b="0" dirty="0"/>
+              <a:t>Study of possibilities</a:t>
+            </a:r>
           </a:p>
         </p:txBody>
       </p:sp>
@@ -9215,15 +9206,7 @@
             </a:r>
             <a:r>
               <a:rPr lang="fr-FR" sz="2400" dirty="0"/>
-              <a:t> </a:t>
-            </a:r>
-            <a:r>
-              <a:rPr lang="fr-FR" sz="2400" dirty="0" err="1"/>
-              <a:t>Khemir</a:t>
-            </a:r>
-            <a:r>
-              <a:rPr lang="fr-FR" sz="2400" dirty="0"/>
-              <a:t>, Diane Vera, Jake Penney</a:t>
+              <a:t> Khemir, Diane Ngako, Jake Penney</a:t>
             </a:r>
           </a:p>
         </p:txBody>
@@ -11354,24 +11337,6 @@
 </file>
 
 <file path=customXml/item1.xml><?xml version="1.0" encoding="utf-8"?>
-<p:properties xmlns:p="http://schemas.microsoft.com/office/2006/metadata/properties" xmlns:xsi="http://www.w3.org/2001/XMLSchema-instance" xmlns:pc="http://schemas.microsoft.com/office/infopath/2007/PartnerControls">
-  <documentManagement>
-    <_ip_UnifiedCompliancePolicyUIAction xmlns="http://schemas.microsoft.com/sharepoint/v3" xsi:nil="true"/>
-    <_ip_UnifiedCompliancePolicyProperties xmlns="http://schemas.microsoft.com/sharepoint/v3" xsi:nil="true"/>
-  </documentManagement>
-</p:properties>
-</file>
-
-<file path=customXml/item2.xml><?xml version="1.0" encoding="utf-8"?>
-<?mso-contentType ?>
-<FormTemplates xmlns="http://schemas.microsoft.com/sharepoint/v3/contenttype/forms">
-  <Display>DocumentLibraryForm</Display>
-  <Edit>DocumentLibraryForm</Edit>
-  <New>DocumentLibraryForm</New>
-</FormTemplates>
-</file>
-
-<file path=customXml/item3.xml><?xml version="1.0" encoding="utf-8"?>
 <ct:contentTypeSchema xmlns:ct="http://schemas.microsoft.com/office/2006/metadata/contentType" xmlns:ma="http://schemas.microsoft.com/office/2006/metadata/properties/metaAttributes" ct:_="" ma:_="" ma:contentTypeName="Document" ma:contentTypeID="0x010100DEEA25CC0A0AC24199CDC46C25B8B0BC" ma:contentTypeVersion="10" ma:contentTypeDescription="Create a new document." ma:contentTypeScope="" ma:versionID="e3b47856d4cf355c0dacb39e1084d14f">
   <xsd:schema xmlns:xsd="http://www.w3.org/2001/XMLSchema" xmlns:xs="http://www.w3.org/2001/XMLSchema" xmlns:p="http://schemas.microsoft.com/office/2006/metadata/properties" xmlns:ns1="http://schemas.microsoft.com/sharepoint/v3" xmlns:ns2="6dc4bcd6-49db-4c07-9060-8acfc67cef9f" xmlns:ns3="fb0879af-3eba-417a-a55a-ffe6dcd6ca77" targetNamespace="http://schemas.microsoft.com/office/2006/metadata/properties" ma:root="true" ma:fieldsID="a845a615265fdb1f7b12cc65ac20ecbd" ns1:_="" ns2:_="" ns3:_="">
     <xsd:import namespace="http://schemas.microsoft.com/sharepoint/v3"/>
@@ -11579,25 +11544,25 @@
 </ct:contentTypeSchema>
 </file>
 
-<file path=customXml/itemProps1.xml><?xml version="1.0" encoding="utf-8"?>
-<ds:datastoreItem xmlns:ds="http://schemas.openxmlformats.org/officeDocument/2006/customXml" ds:itemID="{9A1DE3E1-BE43-4468-8986-14BA0CF36A3F}">
-  <ds:schemaRefs>
-    <ds:schemaRef ds:uri="http://schemas.microsoft.com/office/2006/metadata/properties"/>
-    <ds:schemaRef ds:uri="http://schemas.microsoft.com/office/infopath/2007/PartnerControls"/>
-    <ds:schemaRef ds:uri="http://schemas.microsoft.com/sharepoint/v3"/>
-  </ds:schemaRefs>
-</ds:datastoreItem>
+<file path=customXml/item2.xml><?xml version="1.0" encoding="utf-8"?>
+<?mso-contentType ?>
+<FormTemplates xmlns="http://schemas.microsoft.com/sharepoint/v3/contenttype/forms">
+  <Display>DocumentLibraryForm</Display>
+  <Edit>DocumentLibraryForm</Edit>
+  <New>DocumentLibraryForm</New>
+</FormTemplates>
 </file>
 
-<file path=customXml/itemProps2.xml><?xml version="1.0" encoding="utf-8"?>
-<ds:datastoreItem xmlns:ds="http://schemas.openxmlformats.org/officeDocument/2006/customXml" ds:itemID="{0DC75368-59C6-47C9-94A5-81D396CCE5D1}">
-  <ds:schemaRefs>
-    <ds:schemaRef ds:uri="http://schemas.microsoft.com/sharepoint/v3/contenttype/forms"/>
-  </ds:schemaRefs>
-</ds:datastoreItem>
+<file path=customXml/item3.xml><?xml version="1.0" encoding="utf-8"?>
+<p:properties xmlns:p="http://schemas.microsoft.com/office/2006/metadata/properties" xmlns:xsi="http://www.w3.org/2001/XMLSchema-instance" xmlns:pc="http://schemas.microsoft.com/office/infopath/2007/PartnerControls">
+  <documentManagement>
+    <_ip_UnifiedCompliancePolicyUIAction xmlns="http://schemas.microsoft.com/sharepoint/v3" xsi:nil="true"/>
+    <_ip_UnifiedCompliancePolicyProperties xmlns="http://schemas.microsoft.com/sharepoint/v3" xsi:nil="true"/>
+  </documentManagement>
+</p:properties>
 </file>
 
-<file path=customXml/itemProps3.xml><?xml version="1.0" encoding="utf-8"?>
+<file path=customXml/itemProps1.xml><?xml version="1.0" encoding="utf-8"?>
 <ds:datastoreItem xmlns:ds="http://schemas.openxmlformats.org/officeDocument/2006/customXml" ds:itemID="{E58C4112-5095-4F1B-BBD1-26FC52CA7DAC}">
   <ds:schemaRefs>
     <ds:schemaRef ds:uri="http://schemas.microsoft.com/office/2006/metadata/contentType"/>
@@ -11615,4 +11580,22 @@
     <ds:schemaRef ds:uri="http://schemas.microsoft.com/internal/obd"/>
   </ds:schemaRefs>
 </ds:datastoreItem>
+</file>
+
+<file path=customXml/itemProps2.xml><?xml version="1.0" encoding="utf-8"?>
+<ds:datastoreItem xmlns:ds="http://schemas.openxmlformats.org/officeDocument/2006/customXml" ds:itemID="{0DC75368-59C6-47C9-94A5-81D396CCE5D1}">
+  <ds:schemaRefs>
+    <ds:schemaRef ds:uri="http://schemas.microsoft.com/sharepoint/v3/contenttype/forms"/>
+  </ds:schemaRefs>
+</ds:datastoreItem>
+</file>
+
+<file path=customXml/itemProps3.xml><?xml version="1.0" encoding="utf-8"?>
+<ds:datastoreItem xmlns:ds="http://schemas.openxmlformats.org/officeDocument/2006/customXml" ds:itemID="{9A1DE3E1-BE43-4468-8986-14BA0CF36A3F}">
+  <ds:schemaRefs>
+    <ds:schemaRef ds:uri="http://schemas.microsoft.com/office/2006/metadata/properties"/>
+    <ds:schemaRef ds:uri="http://schemas.microsoft.com/office/infopath/2007/PartnerControls"/>
+    <ds:schemaRef ds:uri="http://schemas.microsoft.com/sharepoint/v3"/>
+  </ds:schemaRefs>
+</ds:datastoreItem>
 </file>
</xml_diff>